<commit_message>
fix some images in Ch 6
</commit_message>
<xml_diff>
--- a/images/copyright.pptx
+++ b/images/copyright.pptx
@@ -6,6 +6,8 @@
   </p:sldMasterIdLst>
   <p:sldIdLst>
     <p:sldId id="257" r:id="rId2"/>
+    <p:sldId id="258" r:id="rId3"/>
+    <p:sldId id="259" r:id="rId4"/>
   </p:sldIdLst>
   <p:sldSz cx="12192000" cy="6858000"/>
   <p:notesSz cx="6858000" cy="9144000"/>
@@ -104,6 +106,11 @@
       </a:defRPr>
     </a:lvl9pPr>
   </p:defaultTextStyle>
+  <p:extLst>
+    <p:ext uri="{EFAFB233-063F-42B5-8137-9DF3F51BA10A}">
+      <p15:sldGuideLst xmlns:p15="http://schemas.microsoft.com/office/powerpoint/2012/main"/>
+    </p:ext>
+  </p:extLst>
 </p:presentation>
 </file>
 
@@ -254,7 +261,7 @@
           <a:p>
             <a:fld id="{47B9298D-7D6A-4A6A-965F-DD10535544FF}" type="datetimeFigureOut">
               <a:rPr lang="en-US" smtClean="0"/>
-              <a:t>7/22/2021</a:t>
+              <a:t>7/25/2021</a:t>
             </a:fld>
             <a:endParaRPr lang="en-US"/>
           </a:p>
@@ -452,7 +459,7 @@
           <a:p>
             <a:fld id="{47B9298D-7D6A-4A6A-965F-DD10535544FF}" type="datetimeFigureOut">
               <a:rPr lang="en-US" smtClean="0"/>
-              <a:t>7/22/2021</a:t>
+              <a:t>7/25/2021</a:t>
             </a:fld>
             <a:endParaRPr lang="en-US"/>
           </a:p>
@@ -660,7 +667,7 @@
           <a:p>
             <a:fld id="{47B9298D-7D6A-4A6A-965F-DD10535544FF}" type="datetimeFigureOut">
               <a:rPr lang="en-US" smtClean="0"/>
-              <a:t>7/22/2021</a:t>
+              <a:t>7/25/2021</a:t>
             </a:fld>
             <a:endParaRPr lang="en-US"/>
           </a:p>
@@ -858,7 +865,7 @@
           <a:p>
             <a:fld id="{47B9298D-7D6A-4A6A-965F-DD10535544FF}" type="datetimeFigureOut">
               <a:rPr lang="en-US" smtClean="0"/>
-              <a:t>7/22/2021</a:t>
+              <a:t>7/25/2021</a:t>
             </a:fld>
             <a:endParaRPr lang="en-US"/>
           </a:p>
@@ -1133,7 +1140,7 @@
           <a:p>
             <a:fld id="{47B9298D-7D6A-4A6A-965F-DD10535544FF}" type="datetimeFigureOut">
               <a:rPr lang="en-US" smtClean="0"/>
-              <a:t>7/22/2021</a:t>
+              <a:t>7/25/2021</a:t>
             </a:fld>
             <a:endParaRPr lang="en-US"/>
           </a:p>
@@ -1398,7 +1405,7 @@
           <a:p>
             <a:fld id="{47B9298D-7D6A-4A6A-965F-DD10535544FF}" type="datetimeFigureOut">
               <a:rPr lang="en-US" smtClean="0"/>
-              <a:t>7/22/2021</a:t>
+              <a:t>7/25/2021</a:t>
             </a:fld>
             <a:endParaRPr lang="en-US"/>
           </a:p>
@@ -1810,7 +1817,7 @@
           <a:p>
             <a:fld id="{47B9298D-7D6A-4A6A-965F-DD10535544FF}" type="datetimeFigureOut">
               <a:rPr lang="en-US" smtClean="0"/>
-              <a:t>7/22/2021</a:t>
+              <a:t>7/25/2021</a:t>
             </a:fld>
             <a:endParaRPr lang="en-US"/>
           </a:p>
@@ -1951,7 +1958,7 @@
           <a:p>
             <a:fld id="{47B9298D-7D6A-4A6A-965F-DD10535544FF}" type="datetimeFigureOut">
               <a:rPr lang="en-US" smtClean="0"/>
-              <a:t>7/22/2021</a:t>
+              <a:t>7/25/2021</a:t>
             </a:fld>
             <a:endParaRPr lang="en-US"/>
           </a:p>
@@ -2064,7 +2071,7 @@
           <a:p>
             <a:fld id="{47B9298D-7D6A-4A6A-965F-DD10535544FF}" type="datetimeFigureOut">
               <a:rPr lang="en-US" smtClean="0"/>
-              <a:t>7/22/2021</a:t>
+              <a:t>7/25/2021</a:t>
             </a:fld>
             <a:endParaRPr lang="en-US"/>
           </a:p>
@@ -2375,7 +2382,7 @@
           <a:p>
             <a:fld id="{47B9298D-7D6A-4A6A-965F-DD10535544FF}" type="datetimeFigureOut">
               <a:rPr lang="en-US" smtClean="0"/>
-              <a:t>7/22/2021</a:t>
+              <a:t>7/25/2021</a:t>
             </a:fld>
             <a:endParaRPr lang="en-US"/>
           </a:p>
@@ -2663,7 +2670,7 @@
           <a:p>
             <a:fld id="{47B9298D-7D6A-4A6A-965F-DD10535544FF}" type="datetimeFigureOut">
               <a:rPr lang="en-US" smtClean="0"/>
-              <a:t>7/22/2021</a:t>
+              <a:t>7/25/2021</a:t>
             </a:fld>
             <a:endParaRPr lang="en-US"/>
           </a:p>
@@ -2904,7 +2911,7 @@
           <a:p>
             <a:fld id="{47B9298D-7D6A-4A6A-965F-DD10535544FF}" type="datetimeFigureOut">
               <a:rPr lang="en-US" smtClean="0"/>
-              <a:t>7/22/2021</a:t>
+              <a:t>7/25/2021</a:t>
             </a:fld>
             <a:endParaRPr lang="en-US"/>
           </a:p>
@@ -3321,95 +3328,6 @@
           <a:chExt cx="0" cy="0"/>
         </a:xfrm>
       </p:grpSpPr>
-      <p:sp>
-        <p:nvSpPr>
-          <p:cNvPr id="2" name="Rectangle: Rounded Corners 1">
-            <a:extLst>
-              <a:ext uri="{FF2B5EF4-FFF2-40B4-BE49-F238E27FC236}">
-                <a16:creationId xmlns:a16="http://schemas.microsoft.com/office/drawing/2014/main" id="{058C42A3-EBEE-41D9-BAF4-E5885214733D}"/>
-              </a:ext>
-            </a:extLst>
-          </p:cNvPr>
-          <p:cNvSpPr/>
-          <p:nvPr/>
-        </p:nvSpPr>
-        <p:spPr>
-          <a:xfrm>
-            <a:off x="1664411" y="1489752"/>
-            <a:ext cx="3200400" cy="2286000"/>
-          </a:xfrm>
-          <a:prstGeom prst="roundRect">
-            <a:avLst/>
-          </a:prstGeom>
-          <a:solidFill>
-            <a:schemeClr val="tx2">
-              <a:lumMod val="40000"/>
-              <a:lumOff val="60000"/>
-              <a:alpha val="50000"/>
-            </a:schemeClr>
-          </a:solidFill>
-        </p:spPr>
-        <p:style>
-          <a:lnRef idx="2">
-            <a:schemeClr val="accent1">
-              <a:shade val="50000"/>
-            </a:schemeClr>
-          </a:lnRef>
-          <a:fillRef idx="1">
-            <a:schemeClr val="accent1"/>
-          </a:fillRef>
-          <a:effectRef idx="0">
-            <a:schemeClr val="accent1"/>
-          </a:effectRef>
-          <a:fontRef idx="minor">
-            <a:schemeClr val="lt1"/>
-          </a:fontRef>
-        </p:style>
-        <p:txBody>
-          <a:bodyPr rtlCol="0" anchor="ctr"/>
-          <a:lstStyle/>
-          <a:p>
-            <a:pPr algn="ctr"/>
-            <a:endParaRPr lang="en-US"/>
-          </a:p>
-        </p:txBody>
-      </p:sp>
-      <p:sp>
-        <p:nvSpPr>
-          <p:cNvPr id="3" name="TextBox 2">
-            <a:extLst>
-              <a:ext uri="{FF2B5EF4-FFF2-40B4-BE49-F238E27FC236}">
-                <a16:creationId xmlns:a16="http://schemas.microsoft.com/office/drawing/2014/main" id="{56FE3DC1-18D2-4AC6-B6DE-2C3D4F63429A}"/>
-              </a:ext>
-            </a:extLst>
-          </p:cNvPr>
-          <p:cNvSpPr txBox="1"/>
-          <p:nvPr/>
-        </p:nvSpPr>
-        <p:spPr>
-          <a:xfrm>
-            <a:off x="1958605" y="1802202"/>
-            <a:ext cx="2616200" cy="1569660"/>
-          </a:xfrm>
-          <a:prstGeom prst="rect">
-            <a:avLst/>
-          </a:prstGeom>
-          <a:noFill/>
-        </p:spPr>
-        <p:txBody>
-          <a:bodyPr wrap="square" rtlCol="0">
-            <a:spAutoFit/>
-          </a:bodyPr>
-          <a:lstStyle/>
-          <a:p>
-            <a:pPr algn="ctr"/>
-            <a:r>
-              <a:rPr lang="en-US" sz="3200" dirty="0"/>
-              <a:t>© Copyrighted image</a:t>
-            </a:r>
-          </a:p>
-        </p:txBody>
-      </p:sp>
       <p:pic>
         <p:nvPicPr>
           <p:cNvPr id="5" name="Picture 4" descr="Icon&#10;&#10;Description automatically generated">
@@ -3439,8 +3357,213 @@
         </p:blipFill>
         <p:spPr>
           <a:xfrm>
-            <a:off x="6280505" y="1489752"/>
+            <a:off x="5670905" y="1299252"/>
             <a:ext cx="2667000" cy="2667000"/>
+          </a:xfrm>
+          <a:prstGeom prst="rect">
+            <a:avLst/>
+          </a:prstGeom>
+        </p:spPr>
+      </p:pic>
+      <p:grpSp>
+        <p:nvGrpSpPr>
+          <p:cNvPr id="10" name="Group 9">
+            <a:extLst>
+              <a:ext uri="{FF2B5EF4-FFF2-40B4-BE49-F238E27FC236}">
+                <a16:creationId xmlns:a16="http://schemas.microsoft.com/office/drawing/2014/main" id="{4FB25025-3BE2-4455-BE7A-481D67B103EF}"/>
+              </a:ext>
+            </a:extLst>
+          </p:cNvPr>
+          <p:cNvGrpSpPr/>
+          <p:nvPr/>
+        </p:nvGrpSpPr>
+        <p:grpSpPr>
+          <a:xfrm>
+            <a:off x="1664411" y="1489752"/>
+            <a:ext cx="3200400" cy="2286000"/>
+            <a:chOff x="1664411" y="1489752"/>
+            <a:chExt cx="3200400" cy="2286000"/>
+          </a:xfrm>
+        </p:grpSpPr>
+        <p:sp>
+          <p:nvSpPr>
+            <p:cNvPr id="2" name="Rectangle: Rounded Corners 1">
+              <a:extLst>
+                <a:ext uri="{FF2B5EF4-FFF2-40B4-BE49-F238E27FC236}">
+                  <a16:creationId xmlns:a16="http://schemas.microsoft.com/office/drawing/2014/main" id="{058C42A3-EBEE-41D9-BAF4-E5885214733D}"/>
+                </a:ext>
+              </a:extLst>
+            </p:cNvPr>
+            <p:cNvSpPr/>
+            <p:nvPr/>
+          </p:nvSpPr>
+          <p:spPr>
+            <a:xfrm>
+              <a:off x="1664411" y="1489752"/>
+              <a:ext cx="3200400" cy="2286000"/>
+            </a:xfrm>
+            <a:prstGeom prst="roundRect">
+              <a:avLst/>
+            </a:prstGeom>
+            <a:solidFill>
+              <a:schemeClr val="tx2">
+                <a:lumMod val="40000"/>
+                <a:lumOff val="60000"/>
+                <a:alpha val="50000"/>
+              </a:schemeClr>
+            </a:solidFill>
+          </p:spPr>
+          <p:style>
+            <a:lnRef idx="2">
+              <a:schemeClr val="accent1">
+                <a:shade val="50000"/>
+              </a:schemeClr>
+            </a:lnRef>
+            <a:fillRef idx="1">
+              <a:schemeClr val="accent1"/>
+            </a:fillRef>
+            <a:effectRef idx="0">
+              <a:schemeClr val="accent1"/>
+            </a:effectRef>
+            <a:fontRef idx="minor">
+              <a:schemeClr val="lt1"/>
+            </a:fontRef>
+          </p:style>
+          <p:txBody>
+            <a:bodyPr rtlCol="0" anchor="ctr"/>
+            <a:lstStyle/>
+            <a:p>
+              <a:pPr algn="ctr"/>
+              <a:endParaRPr lang="en-US"/>
+            </a:p>
+          </p:txBody>
+        </p:sp>
+        <p:grpSp>
+          <p:nvGrpSpPr>
+            <p:cNvPr id="4" name="Group 3">
+              <a:extLst>
+                <a:ext uri="{FF2B5EF4-FFF2-40B4-BE49-F238E27FC236}">
+                  <a16:creationId xmlns:a16="http://schemas.microsoft.com/office/drawing/2014/main" id="{96736528-D6D0-481C-944B-4DD0B131B400}"/>
+                </a:ext>
+              </a:extLst>
+            </p:cNvPr>
+            <p:cNvGrpSpPr/>
+            <p:nvPr/>
+          </p:nvGrpSpPr>
+          <p:grpSpPr>
+            <a:xfrm>
+              <a:off x="1890917" y="1530392"/>
+              <a:ext cx="2747388" cy="2194560"/>
+              <a:chOff x="1890917" y="1530392"/>
+              <a:chExt cx="2747388" cy="2194560"/>
+            </a:xfrm>
+          </p:grpSpPr>
+          <p:sp>
+            <p:nvSpPr>
+              <p:cNvPr id="3" name="TextBox 2">
+                <a:extLst>
+                  <a:ext uri="{FF2B5EF4-FFF2-40B4-BE49-F238E27FC236}">
+                    <a16:creationId xmlns:a16="http://schemas.microsoft.com/office/drawing/2014/main" id="{56FE3DC1-18D2-4AC6-B6DE-2C3D4F63429A}"/>
+                  </a:ext>
+                </a:extLst>
+              </p:cNvPr>
+              <p:cNvSpPr txBox="1"/>
+              <p:nvPr/>
+            </p:nvSpPr>
+            <p:spPr>
+              <a:xfrm>
+                <a:off x="1958605" y="1802202"/>
+                <a:ext cx="2616200" cy="1569660"/>
+              </a:xfrm>
+              <a:prstGeom prst="rect">
+                <a:avLst/>
+              </a:prstGeom>
+              <a:noFill/>
+            </p:spPr>
+            <p:txBody>
+              <a:bodyPr wrap="square" rtlCol="0">
+                <a:spAutoFit/>
+              </a:bodyPr>
+              <a:lstStyle/>
+              <a:p>
+                <a:pPr algn="ctr"/>
+                <a:r>
+                  <a:rPr lang="en-US" sz="3200" dirty="0"/>
+                  <a:t>© Copyrighted image</a:t>
+                </a:r>
+              </a:p>
+            </p:txBody>
+          </p:sp>
+          <p:pic>
+            <p:nvPicPr>
+              <p:cNvPr id="7" name="Picture 6" descr="Icon&#10;&#10;Description automatically generated">
+                <a:extLst>
+                  <a:ext uri="{FF2B5EF4-FFF2-40B4-BE49-F238E27FC236}">
+                    <a16:creationId xmlns:a16="http://schemas.microsoft.com/office/drawing/2014/main" id="{918FEBA2-2067-451B-8638-9233CD148461}"/>
+                  </a:ext>
+                </a:extLst>
+              </p:cNvPr>
+              <p:cNvPicPr>
+                <a:picLocks noChangeAspect="1"/>
+              </p:cNvPicPr>
+              <p:nvPr/>
+            </p:nvPicPr>
+            <p:blipFill>
+              <a:blip r:embed="rId3">
+                <a:alphaModFix amt="20000"/>
+                <a:extLst>
+                  <a:ext uri="{28A0092B-C50C-407E-A947-70E740481C1C}">
+                    <a14:useLocalDpi xmlns:a14="http://schemas.microsoft.com/office/drawing/2010/main" val="0"/>
+                  </a:ext>
+                </a:extLst>
+              </a:blip>
+              <a:stretch>
+                <a:fillRect/>
+              </a:stretch>
+            </p:blipFill>
+            <p:spPr>
+              <a:xfrm>
+                <a:off x="1890917" y="1530392"/>
+                <a:ext cx="2747388" cy="2194560"/>
+              </a:xfrm>
+              <a:prstGeom prst="rect">
+                <a:avLst/>
+              </a:prstGeom>
+            </p:spPr>
+          </p:pic>
+        </p:grpSp>
+      </p:grpSp>
+      <p:pic>
+        <p:nvPicPr>
+          <p:cNvPr id="6" name="Picture 5" descr="Icon&#10;&#10;Description automatically generated">
+            <a:extLst>
+              <a:ext uri="{FF2B5EF4-FFF2-40B4-BE49-F238E27FC236}">
+                <a16:creationId xmlns:a16="http://schemas.microsoft.com/office/drawing/2014/main" id="{C14C39B1-665E-495E-9B9D-419A1CE9D2C1}"/>
+              </a:ext>
+            </a:extLst>
+          </p:cNvPr>
+          <p:cNvPicPr>
+            <a:picLocks noChangeAspect="1"/>
+          </p:cNvPicPr>
+          <p:nvPr/>
+        </p:nvPicPr>
+        <p:blipFill>
+          <a:blip r:embed="rId3">
+            <a:alphaModFix amt="20000"/>
+            <a:extLst>
+              <a:ext uri="{28A0092B-C50C-407E-A947-70E740481C1C}">
+                <a14:useLocalDpi xmlns:a14="http://schemas.microsoft.com/office/drawing/2010/main" val="0"/>
+              </a:ext>
+            </a:extLst>
+          </a:blip>
+          <a:stretch>
+            <a:fillRect/>
+          </a:stretch>
+        </p:blipFill>
+        <p:spPr>
+          <a:xfrm>
+            <a:off x="4722306" y="4372652"/>
+            <a:ext cx="2747388" cy="2194560"/>
           </a:xfrm>
           <a:prstGeom prst="rect">
             <a:avLst/>
@@ -3449,10 +3572,10 @@
       </p:pic>
       <p:pic>
         <p:nvPicPr>
-          <p:cNvPr id="7" name="Picture 6" descr="Icon&#10;&#10;Description automatically generated">
-            <a:extLst>
-              <a:ext uri="{FF2B5EF4-FFF2-40B4-BE49-F238E27FC236}">
-                <a16:creationId xmlns:a16="http://schemas.microsoft.com/office/drawing/2014/main" id="{918FEBA2-2067-451B-8638-9233CD148461}"/>
+          <p:cNvPr id="8" name="Picture 7" descr="Icon&#10;&#10;Description automatically generated">
+            <a:extLst>
+              <a:ext uri="{FF2B5EF4-FFF2-40B4-BE49-F238E27FC236}">
+                <a16:creationId xmlns:a16="http://schemas.microsoft.com/office/drawing/2014/main" id="{65ECD2B0-6E81-4638-9074-75F37FAB41BD}"/>
               </a:ext>
             </a:extLst>
           </p:cNvPr>
@@ -3476,7 +3599,7 @@
         </p:blipFill>
         <p:spPr>
           <a:xfrm>
-            <a:off x="1890917" y="1489752"/>
+            <a:off x="7923417" y="4270968"/>
             <a:ext cx="2747388" cy="2194560"/>
           </a:xfrm>
           <a:prstGeom prst="rect">
@@ -3484,10 +3607,518 @@
           </a:prstGeom>
         </p:spPr>
       </p:pic>
+      <p:sp>
+        <p:nvSpPr>
+          <p:cNvPr id="9" name="TextBox 8">
+            <a:extLst>
+              <a:ext uri="{FF2B5EF4-FFF2-40B4-BE49-F238E27FC236}">
+                <a16:creationId xmlns:a16="http://schemas.microsoft.com/office/drawing/2014/main" id="{7F57FF6F-F945-4825-95B7-7B974C09F476}"/>
+              </a:ext>
+            </a:extLst>
+          </p:cNvPr>
+          <p:cNvSpPr txBox="1"/>
+          <p:nvPr/>
+        </p:nvSpPr>
+        <p:spPr>
+          <a:xfrm>
+            <a:off x="8925295" y="887802"/>
+            <a:ext cx="2616200" cy="1569660"/>
+          </a:xfrm>
+          <a:prstGeom prst="rect">
+            <a:avLst/>
+          </a:prstGeom>
+          <a:noFill/>
+        </p:spPr>
+        <p:txBody>
+          <a:bodyPr wrap="square" rtlCol="0">
+            <a:spAutoFit/>
+          </a:bodyPr>
+          <a:lstStyle/>
+          <a:p>
+            <a:pPr algn="ctr"/>
+            <a:r>
+              <a:rPr lang="en-US" sz="3200" dirty="0"/>
+              <a:t>© Copyrighted image</a:t>
+            </a:r>
+          </a:p>
+        </p:txBody>
+      </p:sp>
     </p:spTree>
     <p:extLst>
       <p:ext uri="{BB962C8B-B14F-4D97-AF65-F5344CB8AC3E}">
         <p14:creationId xmlns:p14="http://schemas.microsoft.com/office/powerpoint/2010/main" val="3951122571"/>
+      </p:ext>
+    </p:extLst>
+  </p:cSld>
+  <p:clrMapOvr>
+    <a:masterClrMapping/>
+  </p:clrMapOvr>
+</p:sld>
+</file>
+
+<file path=ppt/slides/slide2.xml><?xml version="1.0" encoding="utf-8"?>
+<p:sld xmlns:a="http://schemas.openxmlformats.org/drawingml/2006/main" xmlns:r="http://schemas.openxmlformats.org/officeDocument/2006/relationships" xmlns:p="http://schemas.openxmlformats.org/presentationml/2006/main">
+  <p:cSld>
+    <p:spTree>
+      <p:nvGrpSpPr>
+        <p:cNvPr id="1" name=""/>
+        <p:cNvGrpSpPr/>
+        <p:nvPr/>
+      </p:nvGrpSpPr>
+      <p:grpSpPr>
+        <a:xfrm>
+          <a:off x="0" y="0"/>
+          <a:ext cx="0" cy="0"/>
+          <a:chOff x="0" y="0"/>
+          <a:chExt cx="0" cy="0"/>
+        </a:xfrm>
+      </p:grpSpPr>
+      <p:pic>
+        <p:nvPicPr>
+          <p:cNvPr id="3" name="Picture 2" descr="Chart, scatter chart&#10;&#10;Description automatically generated">
+            <a:extLst>
+              <a:ext uri="{FF2B5EF4-FFF2-40B4-BE49-F238E27FC236}">
+                <a16:creationId xmlns:a16="http://schemas.microsoft.com/office/drawing/2014/main" id="{3FC9C169-E80E-4C6A-ADF5-D4FDAF4F566D}"/>
+              </a:ext>
+            </a:extLst>
+          </p:cNvPr>
+          <p:cNvPicPr>
+            <a:picLocks noChangeAspect="1"/>
+          </p:cNvPicPr>
+          <p:nvPr/>
+        </p:nvPicPr>
+        <p:blipFill>
+          <a:blip r:embed="rId2">
+            <a:extLst>
+              <a:ext uri="{28A0092B-C50C-407E-A947-70E740481C1C}">
+                <a14:useLocalDpi xmlns:a14="http://schemas.microsoft.com/office/drawing/2010/main" val="0"/>
+              </a:ext>
+            </a:extLst>
+          </a:blip>
+          <a:stretch>
+            <a:fillRect/>
+          </a:stretch>
+        </p:blipFill>
+        <p:spPr>
+          <a:xfrm>
+            <a:off x="579625" y="724190"/>
+            <a:ext cx="8382017" cy="6001524"/>
+          </a:xfrm>
+          <a:prstGeom prst="rect">
+            <a:avLst/>
+          </a:prstGeom>
+        </p:spPr>
+      </p:pic>
+      <p:grpSp>
+        <p:nvGrpSpPr>
+          <p:cNvPr id="8" name="Group 7">
+            <a:extLst>
+              <a:ext uri="{FF2B5EF4-FFF2-40B4-BE49-F238E27FC236}">
+                <a16:creationId xmlns:a16="http://schemas.microsoft.com/office/drawing/2014/main" id="{C69210FB-06EF-47D6-ABAA-17F8D7B2A149}"/>
+              </a:ext>
+            </a:extLst>
+          </p:cNvPr>
+          <p:cNvGrpSpPr>
+            <a:grpSpLocks noChangeAspect="1"/>
+          </p:cNvGrpSpPr>
+          <p:nvPr/>
+        </p:nvGrpSpPr>
+        <p:grpSpPr>
+          <a:xfrm>
+            <a:off x="4481082" y="1197652"/>
+            <a:ext cx="4480560" cy="3200400"/>
+            <a:chOff x="1664411" y="1489752"/>
+            <a:chExt cx="3200400" cy="2286000"/>
+          </a:xfrm>
+        </p:grpSpPr>
+        <p:sp>
+          <p:nvSpPr>
+            <p:cNvPr id="9" name="Rectangle: Rounded Corners 8">
+              <a:extLst>
+                <a:ext uri="{FF2B5EF4-FFF2-40B4-BE49-F238E27FC236}">
+                  <a16:creationId xmlns:a16="http://schemas.microsoft.com/office/drawing/2014/main" id="{FA2F0676-1F71-43A4-917C-B2B33DA6BAD8}"/>
+                </a:ext>
+              </a:extLst>
+            </p:cNvPr>
+            <p:cNvSpPr/>
+            <p:nvPr/>
+          </p:nvSpPr>
+          <p:spPr>
+            <a:xfrm>
+              <a:off x="1664411" y="1489752"/>
+              <a:ext cx="3200400" cy="2286000"/>
+            </a:xfrm>
+            <a:prstGeom prst="roundRect">
+              <a:avLst/>
+            </a:prstGeom>
+            <a:solidFill>
+              <a:schemeClr val="tx2">
+                <a:lumMod val="40000"/>
+                <a:lumOff val="60000"/>
+                <a:alpha val="50000"/>
+              </a:schemeClr>
+            </a:solidFill>
+          </p:spPr>
+          <p:style>
+            <a:lnRef idx="2">
+              <a:schemeClr val="accent1">
+                <a:shade val="50000"/>
+              </a:schemeClr>
+            </a:lnRef>
+            <a:fillRef idx="1">
+              <a:schemeClr val="accent1"/>
+            </a:fillRef>
+            <a:effectRef idx="0">
+              <a:schemeClr val="accent1"/>
+            </a:effectRef>
+            <a:fontRef idx="minor">
+              <a:schemeClr val="lt1"/>
+            </a:fontRef>
+          </p:style>
+          <p:txBody>
+            <a:bodyPr rtlCol="0" anchor="ctr"/>
+            <a:lstStyle/>
+            <a:p>
+              <a:pPr algn="ctr"/>
+              <a:endParaRPr lang="en-US"/>
+            </a:p>
+          </p:txBody>
+        </p:sp>
+        <p:grpSp>
+          <p:nvGrpSpPr>
+            <p:cNvPr id="10" name="Group 9">
+              <a:extLst>
+                <a:ext uri="{FF2B5EF4-FFF2-40B4-BE49-F238E27FC236}">
+                  <a16:creationId xmlns:a16="http://schemas.microsoft.com/office/drawing/2014/main" id="{5648E1C4-0E89-4528-B016-04E7F787F7D6}"/>
+                </a:ext>
+              </a:extLst>
+            </p:cNvPr>
+            <p:cNvGrpSpPr/>
+            <p:nvPr/>
+          </p:nvGrpSpPr>
+          <p:grpSpPr>
+            <a:xfrm>
+              <a:off x="1890917" y="1530392"/>
+              <a:ext cx="2747388" cy="2194560"/>
+              <a:chOff x="1890917" y="1530392"/>
+              <a:chExt cx="2747388" cy="2194560"/>
+            </a:xfrm>
+          </p:grpSpPr>
+          <p:sp>
+            <p:nvSpPr>
+              <p:cNvPr id="11" name="TextBox 10">
+                <a:extLst>
+                  <a:ext uri="{FF2B5EF4-FFF2-40B4-BE49-F238E27FC236}">
+                    <a16:creationId xmlns:a16="http://schemas.microsoft.com/office/drawing/2014/main" id="{FB20A4FE-FAD8-4B8C-8ADB-5DE169C15E63}"/>
+                  </a:ext>
+                </a:extLst>
+              </p:cNvPr>
+              <p:cNvSpPr txBox="1"/>
+              <p:nvPr/>
+            </p:nvSpPr>
+            <p:spPr>
+              <a:xfrm>
+                <a:off x="1958605" y="1802202"/>
+                <a:ext cx="2616200" cy="1569660"/>
+              </a:xfrm>
+              <a:prstGeom prst="rect">
+                <a:avLst/>
+              </a:prstGeom>
+              <a:noFill/>
+            </p:spPr>
+            <p:txBody>
+              <a:bodyPr wrap="square" rtlCol="0">
+                <a:spAutoFit/>
+              </a:bodyPr>
+              <a:lstStyle/>
+              <a:p>
+                <a:pPr algn="ctr"/>
+                <a:r>
+                  <a:rPr lang="en-US" sz="3200" dirty="0"/>
+                  <a:t>© Copyrighted image</a:t>
+                </a:r>
+              </a:p>
+            </p:txBody>
+          </p:sp>
+          <p:pic>
+            <p:nvPicPr>
+              <p:cNvPr id="12" name="Picture 11" descr="Icon&#10;&#10;Description automatically generated">
+                <a:extLst>
+                  <a:ext uri="{FF2B5EF4-FFF2-40B4-BE49-F238E27FC236}">
+                    <a16:creationId xmlns:a16="http://schemas.microsoft.com/office/drawing/2014/main" id="{AF8C2915-78AC-47EE-BCB8-58690C9320F3}"/>
+                  </a:ext>
+                </a:extLst>
+              </p:cNvPr>
+              <p:cNvPicPr>
+                <a:picLocks noChangeAspect="1"/>
+              </p:cNvPicPr>
+              <p:nvPr/>
+            </p:nvPicPr>
+            <p:blipFill>
+              <a:blip r:embed="rId3">
+                <a:alphaModFix amt="20000"/>
+                <a:extLst>
+                  <a:ext uri="{28A0092B-C50C-407E-A947-70E740481C1C}">
+                    <a14:useLocalDpi xmlns:a14="http://schemas.microsoft.com/office/drawing/2010/main" val="0"/>
+                  </a:ext>
+                </a:extLst>
+              </a:blip>
+              <a:stretch>
+                <a:fillRect/>
+              </a:stretch>
+            </p:blipFill>
+            <p:spPr>
+              <a:xfrm>
+                <a:off x="1890917" y="1530392"/>
+                <a:ext cx="2747388" cy="2194560"/>
+              </a:xfrm>
+              <a:prstGeom prst="rect">
+                <a:avLst/>
+              </a:prstGeom>
+            </p:spPr>
+          </p:pic>
+        </p:grpSp>
+      </p:grpSp>
+    </p:spTree>
+    <p:extLst>
+      <p:ext uri="{BB962C8B-B14F-4D97-AF65-F5344CB8AC3E}">
+        <p14:creationId xmlns:p14="http://schemas.microsoft.com/office/powerpoint/2010/main" val="2125888066"/>
+      </p:ext>
+    </p:extLst>
+  </p:cSld>
+  <p:clrMapOvr>
+    <a:masterClrMapping/>
+  </p:clrMapOvr>
+</p:sld>
+</file>
+
+<file path=ppt/slides/slide3.xml><?xml version="1.0" encoding="utf-8"?>
+<p:sld xmlns:a="http://schemas.openxmlformats.org/drawingml/2006/main" xmlns:r="http://schemas.openxmlformats.org/officeDocument/2006/relationships" xmlns:p="http://schemas.openxmlformats.org/presentationml/2006/main">
+  <p:cSld>
+    <p:spTree>
+      <p:nvGrpSpPr>
+        <p:cNvPr id="1" name=""/>
+        <p:cNvGrpSpPr/>
+        <p:nvPr/>
+      </p:nvGrpSpPr>
+      <p:grpSpPr>
+        <a:xfrm>
+          <a:off x="0" y="0"/>
+          <a:ext cx="0" cy="0"/>
+          <a:chOff x="0" y="0"/>
+          <a:chExt cx="0" cy="0"/>
+        </a:xfrm>
+      </p:grpSpPr>
+      <p:pic>
+        <p:nvPicPr>
+          <p:cNvPr id="3" name="Picture 2" descr="Diagram&#10;&#10;Description automatically generated">
+            <a:extLst>
+              <a:ext uri="{FF2B5EF4-FFF2-40B4-BE49-F238E27FC236}">
+                <a16:creationId xmlns:a16="http://schemas.microsoft.com/office/drawing/2014/main" id="{A601A8ED-F384-4BAF-892F-B4C519FF7539}"/>
+              </a:ext>
+            </a:extLst>
+          </p:cNvPr>
+          <p:cNvPicPr>
+            <a:picLocks noChangeAspect="1"/>
+          </p:cNvPicPr>
+          <p:nvPr/>
+        </p:nvPicPr>
+        <p:blipFill>
+          <a:blip r:embed="rId2">
+            <a:extLst>
+              <a:ext uri="{28A0092B-C50C-407E-A947-70E740481C1C}">
+                <a14:useLocalDpi xmlns:a14="http://schemas.microsoft.com/office/drawing/2010/main" val="0"/>
+              </a:ext>
+            </a:extLst>
+          </a:blip>
+          <a:stretch>
+            <a:fillRect/>
+          </a:stretch>
+        </p:blipFill>
+        <p:spPr>
+          <a:xfrm>
+            <a:off x="1837935" y="419094"/>
+            <a:ext cx="8516129" cy="6019812"/>
+          </a:xfrm>
+          <a:prstGeom prst="rect">
+            <a:avLst/>
+          </a:prstGeom>
+        </p:spPr>
+      </p:pic>
+      <p:grpSp>
+        <p:nvGrpSpPr>
+          <p:cNvPr id="4" name="Group 3">
+            <a:extLst>
+              <a:ext uri="{FF2B5EF4-FFF2-40B4-BE49-F238E27FC236}">
+                <a16:creationId xmlns:a16="http://schemas.microsoft.com/office/drawing/2014/main" id="{F7D5AD2F-8B3F-4843-A37D-5DAAA41E89C5}"/>
+              </a:ext>
+            </a:extLst>
+          </p:cNvPr>
+          <p:cNvGrpSpPr>
+            <a:grpSpLocks noChangeAspect="1"/>
+          </p:cNvGrpSpPr>
+          <p:nvPr/>
+        </p:nvGrpSpPr>
+        <p:grpSpPr>
+          <a:xfrm>
+            <a:off x="5666416" y="943652"/>
+            <a:ext cx="4480560" cy="3200400"/>
+            <a:chOff x="1664411" y="1489752"/>
+            <a:chExt cx="3200400" cy="2286000"/>
+          </a:xfrm>
+        </p:grpSpPr>
+        <p:sp>
+          <p:nvSpPr>
+            <p:cNvPr id="5" name="Rectangle: Rounded Corners 4">
+              <a:extLst>
+                <a:ext uri="{FF2B5EF4-FFF2-40B4-BE49-F238E27FC236}">
+                  <a16:creationId xmlns:a16="http://schemas.microsoft.com/office/drawing/2014/main" id="{D4B7C30E-1AC8-47C6-A2B0-03B835F341CD}"/>
+                </a:ext>
+              </a:extLst>
+            </p:cNvPr>
+            <p:cNvSpPr/>
+            <p:nvPr/>
+          </p:nvSpPr>
+          <p:spPr>
+            <a:xfrm>
+              <a:off x="1664411" y="1489752"/>
+              <a:ext cx="3200400" cy="2286000"/>
+            </a:xfrm>
+            <a:prstGeom prst="roundRect">
+              <a:avLst/>
+            </a:prstGeom>
+            <a:solidFill>
+              <a:schemeClr val="tx2">
+                <a:lumMod val="40000"/>
+                <a:lumOff val="60000"/>
+                <a:alpha val="50000"/>
+              </a:schemeClr>
+            </a:solidFill>
+          </p:spPr>
+          <p:style>
+            <a:lnRef idx="2">
+              <a:schemeClr val="accent1">
+                <a:shade val="50000"/>
+              </a:schemeClr>
+            </a:lnRef>
+            <a:fillRef idx="1">
+              <a:schemeClr val="accent1"/>
+            </a:fillRef>
+            <a:effectRef idx="0">
+              <a:schemeClr val="accent1"/>
+            </a:effectRef>
+            <a:fontRef idx="minor">
+              <a:schemeClr val="lt1"/>
+            </a:fontRef>
+          </p:style>
+          <p:txBody>
+            <a:bodyPr rtlCol="0" anchor="ctr"/>
+            <a:lstStyle/>
+            <a:p>
+              <a:pPr algn="ctr"/>
+              <a:endParaRPr lang="en-US"/>
+            </a:p>
+          </p:txBody>
+        </p:sp>
+        <p:grpSp>
+          <p:nvGrpSpPr>
+            <p:cNvPr id="6" name="Group 5">
+              <a:extLst>
+                <a:ext uri="{FF2B5EF4-FFF2-40B4-BE49-F238E27FC236}">
+                  <a16:creationId xmlns:a16="http://schemas.microsoft.com/office/drawing/2014/main" id="{0A210DF9-AE2E-4F4C-BC5A-F9E948BD7504}"/>
+                </a:ext>
+              </a:extLst>
+            </p:cNvPr>
+            <p:cNvGrpSpPr/>
+            <p:nvPr/>
+          </p:nvGrpSpPr>
+          <p:grpSpPr>
+            <a:xfrm>
+              <a:off x="1890917" y="1530392"/>
+              <a:ext cx="2747388" cy="2194560"/>
+              <a:chOff x="1890917" y="1530392"/>
+              <a:chExt cx="2747388" cy="2194560"/>
+            </a:xfrm>
+          </p:grpSpPr>
+          <p:sp>
+            <p:nvSpPr>
+              <p:cNvPr id="7" name="TextBox 6">
+                <a:extLst>
+                  <a:ext uri="{FF2B5EF4-FFF2-40B4-BE49-F238E27FC236}">
+                    <a16:creationId xmlns:a16="http://schemas.microsoft.com/office/drawing/2014/main" id="{A9DB9A8B-3EC4-425E-8F6C-B596FCAB4991}"/>
+                  </a:ext>
+                </a:extLst>
+              </p:cNvPr>
+              <p:cNvSpPr txBox="1"/>
+              <p:nvPr/>
+            </p:nvSpPr>
+            <p:spPr>
+              <a:xfrm>
+                <a:off x="1958605" y="1802202"/>
+                <a:ext cx="2616200" cy="1569660"/>
+              </a:xfrm>
+              <a:prstGeom prst="rect">
+                <a:avLst/>
+              </a:prstGeom>
+              <a:noFill/>
+            </p:spPr>
+            <p:txBody>
+              <a:bodyPr wrap="square" rtlCol="0">
+                <a:spAutoFit/>
+              </a:bodyPr>
+              <a:lstStyle/>
+              <a:p>
+                <a:pPr algn="ctr"/>
+                <a:r>
+                  <a:rPr lang="en-US" sz="3200" dirty="0"/>
+                  <a:t>© Copyrighted image</a:t>
+                </a:r>
+              </a:p>
+            </p:txBody>
+          </p:sp>
+          <p:pic>
+            <p:nvPicPr>
+              <p:cNvPr id="8" name="Picture 7" descr="Icon&#10;&#10;Description automatically generated">
+                <a:extLst>
+                  <a:ext uri="{FF2B5EF4-FFF2-40B4-BE49-F238E27FC236}">
+                    <a16:creationId xmlns:a16="http://schemas.microsoft.com/office/drawing/2014/main" id="{CE39F740-274A-4F6E-B1D2-BA3249EAD787}"/>
+                  </a:ext>
+                </a:extLst>
+              </p:cNvPr>
+              <p:cNvPicPr>
+                <a:picLocks noChangeAspect="1"/>
+              </p:cNvPicPr>
+              <p:nvPr/>
+            </p:nvPicPr>
+            <p:blipFill>
+              <a:blip r:embed="rId3">
+                <a:alphaModFix amt="20000"/>
+                <a:extLst>
+                  <a:ext uri="{28A0092B-C50C-407E-A947-70E740481C1C}">
+                    <a14:useLocalDpi xmlns:a14="http://schemas.microsoft.com/office/drawing/2010/main" val="0"/>
+                  </a:ext>
+                </a:extLst>
+              </a:blip>
+              <a:stretch>
+                <a:fillRect/>
+              </a:stretch>
+            </p:blipFill>
+            <p:spPr>
+              <a:xfrm>
+                <a:off x="1890917" y="1530392"/>
+                <a:ext cx="2747388" cy="2194560"/>
+              </a:xfrm>
+              <a:prstGeom prst="rect">
+                <a:avLst/>
+              </a:prstGeom>
+            </p:spPr>
+          </p:pic>
+        </p:grpSp>
+      </p:grpSp>
+    </p:spTree>
+    <p:extLst>
+      <p:ext uri="{BB962C8B-B14F-4D97-AF65-F5344CB8AC3E}">
+        <p14:creationId xmlns:p14="http://schemas.microsoft.com/office/powerpoint/2010/main" val="1513975060"/>
       </p:ext>
     </p:extLst>
   </p:cSld>

</xml_diff>